<commit_message>
Added MS Build dates.
</commit_message>
<xml_diff>
--- a/EDMUG Meetup 2019-04-30.pptx
+++ b/EDMUG Meetup 2019-04-30.pptx
@@ -217,7 +217,7 @@
           <a:p>
             <a:fld id="{60DACAEE-CE27-A44E-8214-0B7C88BB09EE}" type="datetimeFigureOut">
               <a:rPr lang="en-US" smtClean="0"/>
-              <a:t>4/30/2019</a:t>
+              <a:t>4/30/19</a:t>
             </a:fld>
             <a:endParaRPr lang="en-US"/>
           </a:p>
@@ -1252,7 +1252,7 @@
           <a:p>
             <a:fld id="{C77E8E39-1E32-2646-9620-EB65EC065088}" type="datetimeFigureOut">
               <a:rPr lang="en-US" smtClean="0"/>
-              <a:t>4/30/2019</a:t>
+              <a:t>4/30/19</a:t>
             </a:fld>
             <a:endParaRPr lang="en-US"/>
           </a:p>
@@ -1420,7 +1420,7 @@
           <a:p>
             <a:fld id="{C77E8E39-1E32-2646-9620-EB65EC065088}" type="datetimeFigureOut">
               <a:rPr lang="en-US" smtClean="0"/>
-              <a:t>4/30/2019</a:t>
+              <a:t>4/30/19</a:t>
             </a:fld>
             <a:endParaRPr lang="en-US"/>
           </a:p>
@@ -1598,7 +1598,7 @@
           <a:p>
             <a:fld id="{C77E8E39-1E32-2646-9620-EB65EC065088}" type="datetimeFigureOut">
               <a:rPr lang="en-US" smtClean="0"/>
-              <a:t>4/30/2019</a:t>
+              <a:t>4/30/19</a:t>
             </a:fld>
             <a:endParaRPr lang="en-US"/>
           </a:p>
@@ -1766,7 +1766,7 @@
           <a:p>
             <a:fld id="{C77E8E39-1E32-2646-9620-EB65EC065088}" type="datetimeFigureOut">
               <a:rPr lang="en-US" smtClean="0"/>
-              <a:t>4/30/2019</a:t>
+              <a:t>4/30/19</a:t>
             </a:fld>
             <a:endParaRPr lang="en-US"/>
           </a:p>
@@ -2011,7 +2011,7 @@
           <a:p>
             <a:fld id="{C77E8E39-1E32-2646-9620-EB65EC065088}" type="datetimeFigureOut">
               <a:rPr lang="en-US" smtClean="0"/>
-              <a:t>4/30/2019</a:t>
+              <a:t>4/30/19</a:t>
             </a:fld>
             <a:endParaRPr lang="en-US"/>
           </a:p>
@@ -2240,7 +2240,7 @@
           <a:p>
             <a:fld id="{C77E8E39-1E32-2646-9620-EB65EC065088}" type="datetimeFigureOut">
               <a:rPr lang="en-US" smtClean="0"/>
-              <a:t>4/30/2019</a:t>
+              <a:t>4/30/19</a:t>
             </a:fld>
             <a:endParaRPr lang="en-US"/>
           </a:p>
@@ -2604,7 +2604,7 @@
           <a:p>
             <a:fld id="{C77E8E39-1E32-2646-9620-EB65EC065088}" type="datetimeFigureOut">
               <a:rPr lang="en-US" smtClean="0"/>
-              <a:t>4/30/2019</a:t>
+              <a:t>4/30/19</a:t>
             </a:fld>
             <a:endParaRPr lang="en-US"/>
           </a:p>
@@ -2721,7 +2721,7 @@
           <a:p>
             <a:fld id="{C77E8E39-1E32-2646-9620-EB65EC065088}" type="datetimeFigureOut">
               <a:rPr lang="en-US" smtClean="0"/>
-              <a:t>4/30/2019</a:t>
+              <a:t>4/30/19</a:t>
             </a:fld>
             <a:endParaRPr lang="en-US"/>
           </a:p>
@@ -2816,7 +2816,7 @@
           <a:p>
             <a:fld id="{C77E8E39-1E32-2646-9620-EB65EC065088}" type="datetimeFigureOut">
               <a:rPr lang="en-US" smtClean="0"/>
-              <a:t>4/30/2019</a:t>
+              <a:t>4/30/19</a:t>
             </a:fld>
             <a:endParaRPr lang="en-US"/>
           </a:p>
@@ -3091,7 +3091,7 @@
           <a:p>
             <a:fld id="{C77E8E39-1E32-2646-9620-EB65EC065088}" type="datetimeFigureOut">
               <a:rPr lang="en-US" smtClean="0"/>
-              <a:t>4/30/2019</a:t>
+              <a:t>4/30/19</a:t>
             </a:fld>
             <a:endParaRPr lang="en-US"/>
           </a:p>
@@ -3343,7 +3343,7 @@
           <a:p>
             <a:fld id="{C77E8E39-1E32-2646-9620-EB65EC065088}" type="datetimeFigureOut">
               <a:rPr lang="en-US" smtClean="0"/>
-              <a:t>4/30/2019</a:t>
+              <a:t>4/30/19</a:t>
             </a:fld>
             <a:endParaRPr lang="en-US"/>
           </a:p>
@@ -3554,7 +3554,7 @@
           <a:p>
             <a:fld id="{C77E8E39-1E32-2646-9620-EB65EC065088}" type="datetimeFigureOut">
               <a:rPr lang="en-US" smtClean="0"/>
-              <a:t>4/30/2019</a:t>
+              <a:t>4/30/19</a:t>
             </a:fld>
             <a:endParaRPr lang="en-US"/>
           </a:p>
@@ -4151,7 +4151,7 @@
         </p:spPr>
         <p:txBody>
           <a:bodyPr>
-            <a:normAutofit fontScale="92500" lnSpcReduction="10000"/>
+            <a:normAutofit fontScale="77500" lnSpcReduction="20000"/>
           </a:bodyPr>
           <a:lstStyle/>
           <a:p>
@@ -4166,7 +4166,37 @@
           <a:p>
             <a:r>
               <a:rPr lang="en-US" dirty="0"/>
-              <a:t>Next Meetup May 28th</a:t>
+              <a:t>Next Meetup May 28</a:t>
+            </a:r>
+            <a:r>
+              <a:rPr lang="en-US" baseline="30000" dirty="0"/>
+              <a:t>th</a:t>
+            </a:r>
+            <a:endParaRPr lang="en-US" dirty="0"/>
+          </a:p>
+          <a:p>
+            <a:endParaRPr lang="en-US" dirty="0"/>
+          </a:p>
+          <a:p>
+            <a:r>
+              <a:rPr lang="en-US" dirty="0"/>
+              <a:t>MS Build May 6</a:t>
+            </a:r>
+            <a:r>
+              <a:rPr lang="en-US" baseline="30000" dirty="0"/>
+              <a:t>th</a:t>
+            </a:r>
+            <a:r>
+              <a:rPr lang="en-US" dirty="0"/>
+              <a:t> to 8</a:t>
+            </a:r>
+            <a:r>
+              <a:rPr lang="en-US" baseline="30000" dirty="0"/>
+              <a:t>th</a:t>
+            </a:r>
+            <a:r>
+              <a:rPr lang="en-US" dirty="0"/>
+              <a:t> </a:t>
             </a:r>
           </a:p>
           <a:p>

</xml_diff>